<commit_message>
Complete Presentation projekt grupp 6.pptx has changed
</commit_message>
<xml_diff>
--- a/Dokument projektarbete/Presentation projekt grupp 6.pptx
+++ b/Dokument projektarbete/Presentation projekt grupp 6.pptx
@@ -300,7 +300,7 @@
           <a:p>
             <a:fld id="{994E5393-35FA-409B-BDDB-85B81B4ACDC4}" type="datetimeFigureOut">
               <a:rPr lang="sv-SE" smtClean="0"/>
-              <a:t>2021-01-13</a:t>
+              <a:t>2021-01-15</a:t>
             </a:fld>
             <a:endParaRPr lang="sv-SE"/>
           </a:p>
@@ -575,7 +575,7 @@
           <a:p>
             <a:fld id="{994E5393-35FA-409B-BDDB-85B81B4ACDC4}" type="datetimeFigureOut">
               <a:rPr lang="sv-SE" smtClean="0"/>
-              <a:t>2021-01-13</a:t>
+              <a:t>2021-01-15</a:t>
             </a:fld>
             <a:endParaRPr lang="sv-SE"/>
           </a:p>
@@ -769,7 +769,7 @@
           <a:p>
             <a:fld id="{994E5393-35FA-409B-BDDB-85B81B4ACDC4}" type="datetimeFigureOut">
               <a:rPr lang="sv-SE" smtClean="0"/>
-              <a:t>2021-01-13</a:t>
+              <a:t>2021-01-15</a:t>
             </a:fld>
             <a:endParaRPr lang="sv-SE"/>
           </a:p>
@@ -1042,7 +1042,7 @@
           <a:p>
             <a:fld id="{994E5393-35FA-409B-BDDB-85B81B4ACDC4}" type="datetimeFigureOut">
               <a:rPr lang="sv-SE" smtClean="0"/>
-              <a:t>2021-01-13</a:t>
+              <a:t>2021-01-15</a:t>
             </a:fld>
             <a:endParaRPr lang="sv-SE"/>
           </a:p>
@@ -1383,7 +1383,7 @@
           <a:p>
             <a:fld id="{994E5393-35FA-409B-BDDB-85B81B4ACDC4}" type="datetimeFigureOut">
               <a:rPr lang="sv-SE" smtClean="0"/>
-              <a:t>2021-01-13</a:t>
+              <a:t>2021-01-15</a:t>
             </a:fld>
             <a:endParaRPr lang="sv-SE"/>
           </a:p>
@@ -2006,7 +2006,7 @@
           <a:p>
             <a:fld id="{994E5393-35FA-409B-BDDB-85B81B4ACDC4}" type="datetimeFigureOut">
               <a:rPr lang="sv-SE" smtClean="0"/>
-              <a:t>2021-01-13</a:t>
+              <a:t>2021-01-15</a:t>
             </a:fld>
             <a:endParaRPr lang="sv-SE"/>
           </a:p>
@@ -2866,7 +2866,7 @@
           <a:p>
             <a:fld id="{994E5393-35FA-409B-BDDB-85B81B4ACDC4}" type="datetimeFigureOut">
               <a:rPr lang="sv-SE" smtClean="0"/>
-              <a:t>2021-01-13</a:t>
+              <a:t>2021-01-15</a:t>
             </a:fld>
             <a:endParaRPr lang="sv-SE"/>
           </a:p>
@@ -3036,7 +3036,7 @@
           <a:p>
             <a:fld id="{994E5393-35FA-409B-BDDB-85B81B4ACDC4}" type="datetimeFigureOut">
               <a:rPr lang="sv-SE" smtClean="0"/>
-              <a:t>2021-01-13</a:t>
+              <a:t>2021-01-15</a:t>
             </a:fld>
             <a:endParaRPr lang="sv-SE"/>
           </a:p>
@@ -3216,7 +3216,7 @@
           <a:p>
             <a:fld id="{994E5393-35FA-409B-BDDB-85B81B4ACDC4}" type="datetimeFigureOut">
               <a:rPr lang="sv-SE" smtClean="0"/>
-              <a:t>2021-01-13</a:t>
+              <a:t>2021-01-15</a:t>
             </a:fld>
             <a:endParaRPr lang="sv-SE"/>
           </a:p>
@@ -3386,7 +3386,7 @@
           <a:p>
             <a:fld id="{994E5393-35FA-409B-BDDB-85B81B4ACDC4}" type="datetimeFigureOut">
               <a:rPr lang="sv-SE" smtClean="0"/>
-              <a:t>2021-01-13</a:t>
+              <a:t>2021-01-15</a:t>
             </a:fld>
             <a:endParaRPr lang="sv-SE"/>
           </a:p>
@@ -3633,7 +3633,7 @@
           <a:p>
             <a:fld id="{994E5393-35FA-409B-BDDB-85B81B4ACDC4}" type="datetimeFigureOut">
               <a:rPr lang="sv-SE" smtClean="0"/>
-              <a:t>2021-01-13</a:t>
+              <a:t>2021-01-15</a:t>
             </a:fld>
             <a:endParaRPr lang="sv-SE"/>
           </a:p>
@@ -3925,7 +3925,7 @@
           <a:p>
             <a:fld id="{994E5393-35FA-409B-BDDB-85B81B4ACDC4}" type="datetimeFigureOut">
               <a:rPr lang="sv-SE" smtClean="0"/>
-              <a:t>2021-01-13</a:t>
+              <a:t>2021-01-15</a:t>
             </a:fld>
             <a:endParaRPr lang="sv-SE"/>
           </a:p>
@@ -4369,7 +4369,7 @@
           <a:p>
             <a:fld id="{994E5393-35FA-409B-BDDB-85B81B4ACDC4}" type="datetimeFigureOut">
               <a:rPr lang="sv-SE" smtClean="0"/>
-              <a:t>2021-01-13</a:t>
+              <a:t>2021-01-15</a:t>
             </a:fld>
             <a:endParaRPr lang="sv-SE"/>
           </a:p>
@@ -4487,7 +4487,7 @@
           <a:p>
             <a:fld id="{994E5393-35FA-409B-BDDB-85B81B4ACDC4}" type="datetimeFigureOut">
               <a:rPr lang="sv-SE" smtClean="0"/>
-              <a:t>2021-01-13</a:t>
+              <a:t>2021-01-15</a:t>
             </a:fld>
             <a:endParaRPr lang="sv-SE"/>
           </a:p>
@@ -4582,7 +4582,7 @@
           <a:p>
             <a:fld id="{994E5393-35FA-409B-BDDB-85B81B4ACDC4}" type="datetimeFigureOut">
               <a:rPr lang="sv-SE" smtClean="0"/>
-              <a:t>2021-01-13</a:t>
+              <a:t>2021-01-15</a:t>
             </a:fld>
             <a:endParaRPr lang="sv-SE"/>
           </a:p>
@@ -4861,7 +4861,7 @@
           <a:p>
             <a:fld id="{994E5393-35FA-409B-BDDB-85B81B4ACDC4}" type="datetimeFigureOut">
               <a:rPr lang="sv-SE" smtClean="0"/>
-              <a:t>2021-01-13</a:t>
+              <a:t>2021-01-15</a:t>
             </a:fld>
             <a:endParaRPr lang="sv-SE"/>
           </a:p>
@@ -5136,7 +5136,7 @@
           <a:p>
             <a:fld id="{994E5393-35FA-409B-BDDB-85B81B4ACDC4}" type="datetimeFigureOut">
               <a:rPr lang="sv-SE" smtClean="0"/>
-              <a:t>2021-01-13</a:t>
+              <a:t>2021-01-15</a:t>
             </a:fld>
             <a:endParaRPr lang="sv-SE"/>
           </a:p>
@@ -5565,7 +5565,7 @@
           <a:p>
             <a:fld id="{994E5393-35FA-409B-BDDB-85B81B4ACDC4}" type="datetimeFigureOut">
               <a:rPr lang="sv-SE" smtClean="0"/>
-              <a:t>2021-01-13</a:t>
+              <a:t>2021-01-15</a:t>
             </a:fld>
             <a:endParaRPr lang="sv-SE"/>
           </a:p>
@@ -6358,7 +6358,13 @@
               <a:rPr lang="sv-SE" sz="2800" dirty="0">
                 <a:latin typeface="+mj-lt"/>
               </a:rPr>
-              <a:t>Julio</a:t>
+              <a:t>Julio Cesar Oliva </a:t>
+            </a:r>
+            <a:r>
+              <a:rPr lang="sv-SE" sz="2800">
+                <a:latin typeface="+mj-lt"/>
+              </a:rPr>
+              <a:t>Herrera</a:t>
             </a:r>
             <a:br>
               <a:rPr lang="sv-SE" sz="2800" dirty="0">

</xml_diff>